<commit_message>
all changes during this lesson
</commit_message>
<xml_diff>
--- a/16ass/16ass.pptx
+++ b/16ass/16ass.pptx
@@ -343,7 +343,7 @@
           <a:p>
             <a:fld id="{89AD1261-9EED-2246-A353-D243FB9E7EC9}" type="datetimeFigureOut">
               <a:rPr lang="en-IL" smtClean="0"/>
-              <a:t>05/04/2023</a:t>
+              <a:t>19/04/2023</a:t>
             </a:fld>
             <a:endParaRPr lang="en-IL"/>
           </a:p>
@@ -543,7 +543,7 @@
           <a:p>
             <a:fld id="{89AD1261-9EED-2246-A353-D243FB9E7EC9}" type="datetimeFigureOut">
               <a:rPr lang="en-IL" smtClean="0"/>
-              <a:t>05/04/2023</a:t>
+              <a:t>19/04/2023</a:t>
             </a:fld>
             <a:endParaRPr lang="en-IL"/>
           </a:p>
@@ -753,7 +753,7 @@
           <a:p>
             <a:fld id="{89AD1261-9EED-2246-A353-D243FB9E7EC9}" type="datetimeFigureOut">
               <a:rPr lang="en-IL" smtClean="0"/>
-              <a:t>05/04/2023</a:t>
+              <a:t>19/04/2023</a:t>
             </a:fld>
             <a:endParaRPr lang="en-IL"/>
           </a:p>
@@ -953,7 +953,7 @@
           <a:p>
             <a:fld id="{89AD1261-9EED-2246-A353-D243FB9E7EC9}" type="datetimeFigureOut">
               <a:rPr lang="en-IL" smtClean="0"/>
-              <a:t>05/04/2023</a:t>
+              <a:t>19/04/2023</a:t>
             </a:fld>
             <a:endParaRPr lang="en-IL"/>
           </a:p>
@@ -1229,7 +1229,7 @@
           <a:p>
             <a:fld id="{89AD1261-9EED-2246-A353-D243FB9E7EC9}" type="datetimeFigureOut">
               <a:rPr lang="en-IL" smtClean="0"/>
-              <a:t>05/04/2023</a:t>
+              <a:t>19/04/2023</a:t>
             </a:fld>
             <a:endParaRPr lang="en-IL"/>
           </a:p>
@@ -1497,7 +1497,7 @@
           <a:p>
             <a:fld id="{89AD1261-9EED-2246-A353-D243FB9E7EC9}" type="datetimeFigureOut">
               <a:rPr lang="en-IL" smtClean="0"/>
-              <a:t>05/04/2023</a:t>
+              <a:t>19/04/2023</a:t>
             </a:fld>
             <a:endParaRPr lang="en-IL"/>
           </a:p>
@@ -1912,7 +1912,7 @@
           <a:p>
             <a:fld id="{89AD1261-9EED-2246-A353-D243FB9E7EC9}" type="datetimeFigureOut">
               <a:rPr lang="en-IL" smtClean="0"/>
-              <a:t>05/04/2023</a:t>
+              <a:t>19/04/2023</a:t>
             </a:fld>
             <a:endParaRPr lang="en-IL"/>
           </a:p>
@@ -2054,7 +2054,7 @@
           <a:p>
             <a:fld id="{89AD1261-9EED-2246-A353-D243FB9E7EC9}" type="datetimeFigureOut">
               <a:rPr lang="en-IL" smtClean="0"/>
-              <a:t>05/04/2023</a:t>
+              <a:t>19/04/2023</a:t>
             </a:fld>
             <a:endParaRPr lang="en-IL"/>
           </a:p>
@@ -2167,7 +2167,7 @@
           <a:p>
             <a:fld id="{89AD1261-9EED-2246-A353-D243FB9E7EC9}" type="datetimeFigureOut">
               <a:rPr lang="en-IL" smtClean="0"/>
-              <a:t>05/04/2023</a:t>
+              <a:t>19/04/2023</a:t>
             </a:fld>
             <a:endParaRPr lang="en-IL"/>
           </a:p>
@@ -2480,7 +2480,7 @@
           <a:p>
             <a:fld id="{89AD1261-9EED-2246-A353-D243FB9E7EC9}" type="datetimeFigureOut">
               <a:rPr lang="en-IL" smtClean="0"/>
-              <a:t>05/04/2023</a:t>
+              <a:t>19/04/2023</a:t>
             </a:fld>
             <a:endParaRPr lang="en-IL"/>
           </a:p>
@@ -2769,7 +2769,7 @@
           <a:p>
             <a:fld id="{89AD1261-9EED-2246-A353-D243FB9E7EC9}" type="datetimeFigureOut">
               <a:rPr lang="en-IL" smtClean="0"/>
-              <a:t>05/04/2023</a:t>
+              <a:t>19/04/2023</a:t>
             </a:fld>
             <a:endParaRPr lang="en-IL"/>
           </a:p>
@@ -3012,7 +3012,7 @@
           <a:p>
             <a:fld id="{89AD1261-9EED-2246-A353-D243FB9E7EC9}" type="datetimeFigureOut">
               <a:rPr lang="en-IL" smtClean="0"/>
-              <a:t>05/04/2023</a:t>
+              <a:t>19/04/2023</a:t>
             </a:fld>
             <a:endParaRPr lang="en-IL"/>
           </a:p>
@@ -7925,7 +7925,7 @@
           </a:ln>
           <a:extLst>
             <a:ext uri="{91240B29-F687-4f45-9708-019B960494DF}">
-              <a14:hiddenLine xmlns="" xmlns:p14="http://schemas.microsoft.com/office/powerpoint/2010/main" xmlns:a14="http://schemas.microsoft.com/office/drawing/2010/main" xmlns:a16="http://schemas.microsoft.com/office/drawing/2014/main" w="9525">
+              <a14:hiddenLine xmlns:a16="http://schemas.microsoft.com/office/drawing/2014/main" xmlns:a14="http://schemas.microsoft.com/office/drawing/2010/main" xmlns:p14="http://schemas.microsoft.com/office/powerpoint/2010/main" xmlns="" w="9525">
                 <a:solidFill>
                   <a:srgbClr val="000000"/>
                 </a:solidFill>
@@ -8791,7 +8791,7 @@
           </a:ln>
           <a:extLst>
             <a:ext uri="{91240B29-F687-4f45-9708-019B960494DF}">
-              <a14:hiddenLine xmlns="" xmlns:p14="http://schemas.microsoft.com/office/powerpoint/2010/main" xmlns:a14="http://schemas.microsoft.com/office/drawing/2010/main" xmlns:a16="http://schemas.microsoft.com/office/drawing/2014/main" w="9525">
+              <a14:hiddenLine xmlns:a16="http://schemas.microsoft.com/office/drawing/2014/main" xmlns:a14="http://schemas.microsoft.com/office/drawing/2010/main" xmlns:p14="http://schemas.microsoft.com/office/powerpoint/2010/main" xmlns="" w="9525">
                 <a:solidFill>
                   <a:srgbClr val="000000"/>
                 </a:solidFill>
@@ -9512,7 +9512,7 @@
           </a:ln>
           <a:extLst>
             <a:ext uri="{91240B29-F687-4f45-9708-019B960494DF}">
-              <a14:hiddenLine xmlns="" xmlns:p14="http://schemas.microsoft.com/office/powerpoint/2010/main" xmlns:a14="http://schemas.microsoft.com/office/drawing/2010/main" xmlns:a16="http://schemas.microsoft.com/office/drawing/2014/main" w="9525">
+              <a14:hiddenLine xmlns:a16="http://schemas.microsoft.com/office/drawing/2014/main" xmlns:a14="http://schemas.microsoft.com/office/drawing/2010/main" xmlns:p14="http://schemas.microsoft.com/office/powerpoint/2010/main" xmlns="" w="9525">
                 <a:solidFill>
                   <a:srgbClr val="000000"/>
                 </a:solidFill>
@@ -12991,7 +12991,7 @@
           <a:bodyPr/>
           <a:lstStyle/>
           <a:p>
-            <a:endParaRPr lang="en-IL"/>
+            <a:endParaRPr lang="en-IL" dirty="0"/>
           </a:p>
         </p:txBody>
       </p:sp>

</xml_diff>

<commit_message>
new changes last class
</commit_message>
<xml_diff>
--- a/16ass/16ass.pptx
+++ b/16ass/16ass.pptx
@@ -343,7 +343,7 @@
           <a:p>
             <a:fld id="{89AD1261-9EED-2246-A353-D243FB9E7EC9}" type="datetimeFigureOut">
               <a:rPr lang="en-IL" smtClean="0"/>
-              <a:t>01/05/2023</a:t>
+              <a:t>03/05/2023</a:t>
             </a:fld>
             <a:endParaRPr lang="en-IL"/>
           </a:p>
@@ -543,7 +543,7 @@
           <a:p>
             <a:fld id="{89AD1261-9EED-2246-A353-D243FB9E7EC9}" type="datetimeFigureOut">
               <a:rPr lang="en-IL" smtClean="0"/>
-              <a:t>01/05/2023</a:t>
+              <a:t>03/05/2023</a:t>
             </a:fld>
             <a:endParaRPr lang="en-IL"/>
           </a:p>
@@ -753,7 +753,7 @@
           <a:p>
             <a:fld id="{89AD1261-9EED-2246-A353-D243FB9E7EC9}" type="datetimeFigureOut">
               <a:rPr lang="en-IL" smtClean="0"/>
-              <a:t>01/05/2023</a:t>
+              <a:t>03/05/2023</a:t>
             </a:fld>
             <a:endParaRPr lang="en-IL"/>
           </a:p>
@@ -953,7 +953,7 @@
           <a:p>
             <a:fld id="{89AD1261-9EED-2246-A353-D243FB9E7EC9}" type="datetimeFigureOut">
               <a:rPr lang="en-IL" smtClean="0"/>
-              <a:t>01/05/2023</a:t>
+              <a:t>03/05/2023</a:t>
             </a:fld>
             <a:endParaRPr lang="en-IL"/>
           </a:p>
@@ -1229,7 +1229,7 @@
           <a:p>
             <a:fld id="{89AD1261-9EED-2246-A353-D243FB9E7EC9}" type="datetimeFigureOut">
               <a:rPr lang="en-IL" smtClean="0"/>
-              <a:t>01/05/2023</a:t>
+              <a:t>03/05/2023</a:t>
             </a:fld>
             <a:endParaRPr lang="en-IL"/>
           </a:p>
@@ -1497,7 +1497,7 @@
           <a:p>
             <a:fld id="{89AD1261-9EED-2246-A353-D243FB9E7EC9}" type="datetimeFigureOut">
               <a:rPr lang="en-IL" smtClean="0"/>
-              <a:t>01/05/2023</a:t>
+              <a:t>03/05/2023</a:t>
             </a:fld>
             <a:endParaRPr lang="en-IL"/>
           </a:p>
@@ -1912,7 +1912,7 @@
           <a:p>
             <a:fld id="{89AD1261-9EED-2246-A353-D243FB9E7EC9}" type="datetimeFigureOut">
               <a:rPr lang="en-IL" smtClean="0"/>
-              <a:t>01/05/2023</a:t>
+              <a:t>03/05/2023</a:t>
             </a:fld>
             <a:endParaRPr lang="en-IL"/>
           </a:p>
@@ -2054,7 +2054,7 @@
           <a:p>
             <a:fld id="{89AD1261-9EED-2246-A353-D243FB9E7EC9}" type="datetimeFigureOut">
               <a:rPr lang="en-IL" smtClean="0"/>
-              <a:t>01/05/2023</a:t>
+              <a:t>03/05/2023</a:t>
             </a:fld>
             <a:endParaRPr lang="en-IL"/>
           </a:p>
@@ -2167,7 +2167,7 @@
           <a:p>
             <a:fld id="{89AD1261-9EED-2246-A353-D243FB9E7EC9}" type="datetimeFigureOut">
               <a:rPr lang="en-IL" smtClean="0"/>
-              <a:t>01/05/2023</a:t>
+              <a:t>03/05/2023</a:t>
             </a:fld>
             <a:endParaRPr lang="en-IL"/>
           </a:p>
@@ -2480,7 +2480,7 @@
           <a:p>
             <a:fld id="{89AD1261-9EED-2246-A353-D243FB9E7EC9}" type="datetimeFigureOut">
               <a:rPr lang="en-IL" smtClean="0"/>
-              <a:t>01/05/2023</a:t>
+              <a:t>03/05/2023</a:t>
             </a:fld>
             <a:endParaRPr lang="en-IL"/>
           </a:p>
@@ -2769,7 +2769,7 @@
           <a:p>
             <a:fld id="{89AD1261-9EED-2246-A353-D243FB9E7EC9}" type="datetimeFigureOut">
               <a:rPr lang="en-IL" smtClean="0"/>
-              <a:t>01/05/2023</a:t>
+              <a:t>03/05/2023</a:t>
             </a:fld>
             <a:endParaRPr lang="en-IL"/>
           </a:p>
@@ -3012,7 +3012,7 @@
           <a:p>
             <a:fld id="{89AD1261-9EED-2246-A353-D243FB9E7EC9}" type="datetimeFigureOut">
               <a:rPr lang="en-IL" smtClean="0"/>
-              <a:t>01/05/2023</a:t>
+              <a:t>03/05/2023</a:t>
             </a:fld>
             <a:endParaRPr lang="en-IL"/>
           </a:p>
@@ -5049,7 +5049,7 @@
           <p:nvPr/>
         </p:nvPicPr>
         <p:blipFill>
-          <a:blip r:embed="rId2"/>
+          <a:blip/>
           <a:stretch>
             <a:fillRect/>
           </a:stretch>
@@ -7277,7 +7277,7 @@
           <p:nvPr/>
         </p:nvPicPr>
         <p:blipFill>
-          <a:blip r:embed="rId2"/>
+          <a:blip/>
           <a:stretch>
             <a:fillRect/>
           </a:stretch>
@@ -8176,7 +8176,7 @@
           <p:nvPr/>
         </p:nvPicPr>
         <p:blipFill>
-          <a:blip r:embed="rId2"/>
+          <a:blip/>
           <a:stretch>
             <a:fillRect/>
           </a:stretch>
@@ -9008,7 +9008,7 @@
           <p:nvPr/>
         </p:nvPicPr>
         <p:blipFill>
-          <a:blip r:embed="rId2"/>
+          <a:blip/>
           <a:stretch>
             <a:fillRect/>
           </a:stretch>
@@ -9729,7 +9729,7 @@
           <p:nvPr/>
         </p:nvPicPr>
         <p:blipFill>
-          <a:blip r:embed="rId2"/>
+          <a:blip/>
           <a:stretch>
             <a:fillRect/>
           </a:stretch>
@@ -10074,7 +10074,7 @@
           <p:nvPr/>
         </p:nvPicPr>
         <p:blipFill>
-          <a:blip r:embed="rId2"/>
+          <a:blip/>
           <a:stretch>
             <a:fillRect/>
           </a:stretch>
@@ -10607,7 +10607,7 @@
           <p:nvPr/>
         </p:nvPicPr>
         <p:blipFill>
-          <a:blip r:embed="rId2"/>
+          <a:blip/>
           <a:stretch>
             <a:fillRect/>
           </a:stretch>
@@ -11006,7 +11006,7 @@
           <p:nvPr/>
         </p:nvPicPr>
         <p:blipFill>
-          <a:blip r:embed="rId2"/>
+          <a:blip/>
           <a:stretch>
             <a:fillRect/>
           </a:stretch>
@@ -11405,7 +11405,7 @@
           <p:nvPr/>
         </p:nvPicPr>
         <p:blipFill>
-          <a:blip r:embed="rId2"/>
+          <a:blip/>
           <a:stretch>
             <a:fillRect/>
           </a:stretch>
@@ -12736,7 +12736,7 @@
           <p:nvPr/>
         </p:nvPicPr>
         <p:blipFill>
-          <a:blip r:embed="rId2"/>
+          <a:blip/>
           <a:stretch>
             <a:fillRect/>
           </a:stretch>
@@ -13275,7 +13275,7 @@
           </p:nvPr>
         </p:nvPicPr>
         <p:blipFill>
-          <a:blip r:embed="rId2"/>
+          <a:blip/>
           <a:stretch>
             <a:fillRect/>
           </a:stretch>
@@ -13567,7 +13567,7 @@
           </p:nvPr>
         </p:nvPicPr>
         <p:blipFill>
-          <a:blip r:embed="rId2"/>
+          <a:blip/>
           <a:stretch>
             <a:fillRect/>
           </a:stretch>
@@ -13841,7 +13841,7 @@
           </p:nvPr>
         </p:nvPicPr>
         <p:blipFill>
-          <a:blip r:embed="rId2"/>
+          <a:blip/>
           <a:stretch>
             <a:fillRect/>
           </a:stretch>
@@ -14299,7 +14299,7 @@
           <p:nvPr/>
         </p:nvPicPr>
         <p:blipFill>
-          <a:blip r:embed="rId2"/>
+          <a:blip/>
           <a:stretch>
             <a:fillRect/>
           </a:stretch>
@@ -15308,7 +15308,7 @@
           <p:nvPr/>
         </p:nvPicPr>
         <p:blipFill>
-          <a:blip r:embed="rId2"/>
+          <a:blip/>
           <a:stretch>
             <a:fillRect/>
           </a:stretch>
@@ -15617,7 +15617,7 @@
           <p:nvPr/>
         </p:nvPicPr>
         <p:blipFill>
-          <a:blip r:embed="rId2"/>
+          <a:blip/>
           <a:stretch>
             <a:fillRect/>
           </a:stretch>
@@ -19073,7 +19073,7 @@
           <p:nvPr/>
         </p:nvPicPr>
         <p:blipFill>
-          <a:blip r:embed="rId2"/>
+          <a:blip/>
           <a:stretch>
             <a:fillRect/>
           </a:stretch>
@@ -21860,7 +21860,7 @@
           <p:nvPr/>
         </p:nvPicPr>
         <p:blipFill>
-          <a:blip r:embed="rId2"/>
+          <a:blip/>
           <a:stretch>
             <a:fillRect/>
           </a:stretch>
@@ -22081,7 +22081,7 @@
           </p:nvPr>
         </p:nvPicPr>
         <p:blipFill>
-          <a:blip r:embed="rId2"/>
+          <a:blip/>
           <a:stretch>
             <a:fillRect/>
           </a:stretch>
@@ -22261,7 +22261,7 @@
           </p:nvPr>
         </p:nvPicPr>
         <p:blipFill>
-          <a:blip r:embed="rId2"/>
+          <a:blip/>
           <a:stretch>
             <a:fillRect/>
           </a:stretch>
@@ -22763,7 +22763,7 @@
           <p:nvPr/>
         </p:nvPicPr>
         <p:blipFill>
-          <a:blip r:embed="rId2"/>
+          <a:blip/>
           <a:stretch>
             <a:fillRect/>
           </a:stretch>
@@ -23167,7 +23167,7 @@
           <p:nvPr/>
         </p:nvPicPr>
         <p:blipFill>
-          <a:blip r:embed="rId2"/>
+          <a:blip/>
           <a:stretch>
             <a:fillRect/>
           </a:stretch>
@@ -23324,7 +23324,7 @@
           </p:nvPr>
         </p:nvPicPr>
         <p:blipFill>
-          <a:blip r:embed="rId2"/>
+          <a:blip/>
           <a:stretch>
             <a:fillRect/>
           </a:stretch>
@@ -23712,7 +23712,7 @@
           <p:nvPr/>
         </p:nvPicPr>
         <p:blipFill>
-          <a:blip r:embed="rId2"/>
+          <a:blip/>
           <a:stretch>
             <a:fillRect/>
           </a:stretch>
@@ -24359,7 +24359,7 @@
           <p:nvPr/>
         </p:nvPicPr>
         <p:blipFill>
-          <a:blip r:embed="rId2"/>
+          <a:blip/>
           <a:stretch>
             <a:fillRect/>
           </a:stretch>
@@ -24788,7 +24788,7 @@
           <p:nvPr/>
         </p:nvPicPr>
         <p:blipFill>
-          <a:blip r:embed="rId2"/>
+          <a:blip/>
           <a:stretch>
             <a:fillRect/>
           </a:stretch>
@@ -25025,7 +25025,7 @@
           </p:nvPr>
         </p:nvPicPr>
         <p:blipFill>
-          <a:blip r:embed="rId2"/>
+          <a:blip/>
           <a:stretch>
             <a:fillRect/>
           </a:stretch>
@@ -25378,7 +25378,7 @@
           <p:nvPr/>
         </p:nvPicPr>
         <p:blipFill>
-          <a:blip r:embed="rId2"/>
+          <a:blip/>
           <a:stretch>
             <a:fillRect/>
           </a:stretch>
@@ -25957,7 +25957,7 @@
           </p:nvPr>
         </p:nvPicPr>
         <p:blipFill>
-          <a:blip r:embed="rId2"/>
+          <a:blip/>
           <a:stretch>
             <a:fillRect/>
           </a:stretch>
@@ -26370,7 +26370,7 @@
           <p:nvPr/>
         </p:nvPicPr>
         <p:blipFill>
-          <a:blip r:embed="rId2"/>
+          <a:blip/>
           <a:stretch>
             <a:fillRect/>
           </a:stretch>
@@ -26869,7 +26869,7 @@
           <p:nvPr/>
         </p:nvPicPr>
         <p:blipFill>
-          <a:blip r:embed="rId2"/>
+          <a:blip/>
           <a:stretch>
             <a:fillRect/>
           </a:stretch>
@@ -27163,7 +27163,7 @@
           <p:nvPr/>
         </p:nvPicPr>
         <p:blipFill>
-          <a:blip r:embed="rId2"/>
+          <a:blip/>
           <a:stretch>
             <a:fillRect/>
           </a:stretch>
@@ -27611,7 +27611,7 @@
           <p:nvPr/>
         </p:nvPicPr>
         <p:blipFill>
-          <a:blip r:embed="rId2"/>
+          <a:blip/>
           <a:stretch>
             <a:fillRect/>
           </a:stretch>
@@ -27774,13 +27774,10 @@
           <p:nvPr/>
         </p:nvPicPr>
         <p:blipFill>
-          <a:blip r:embed="rId2">
+          <a:blip>
             <a:extLst>
               <a:ext uri="{28A0092B-C50C-407E-A947-70E740481C1C}">
                 <a14:useLocalDpi xmlns:a14="http://schemas.microsoft.com/office/drawing/2010/main" val="0"/>
-              </a:ext>
-              <a:ext uri="{96DAC541-7B7A-43D3-8B79-37D633B846F1}">
-                <asvg:svgBlip xmlns:asvg="http://schemas.microsoft.com/office/drawing/2016/SVG/main" r:embed="rId3"/>
               </a:ext>
             </a:extLst>
           </a:blip>
@@ -27827,37 +27824,37 @@
           <a:lstStyle/>
           <a:p>
             <a:r>
-              <a:rPr lang="en-US" sz="2000"/>
+              <a:rPr lang="en-US" sz="2000" dirty="0"/>
               <a:t>Promises are a way to handle asynchronous operations in JavaScript and TypeScript. They provide a way to handle the outcome of an asynchronous operation, either a successful outcome or a failure.</a:t>
             </a:r>
           </a:p>
           <a:p>
             <a:r>
-              <a:rPr lang="en-US" sz="2000"/>
+              <a:rPr lang="en-US" sz="2000" dirty="0"/>
               <a:t>In JavaScript, a Promise is an object that represents the eventual completion (or failure) of an asynchronous operation and its resulting value. Promises have three states:</a:t>
             </a:r>
           </a:p>
           <a:p>
             <a:r>
-              <a:rPr lang="en-US" sz="2000"/>
+              <a:rPr lang="en-US" sz="2000" dirty="0"/>
               <a:t>Pending: The initial state. The promise is neither fulfilled nor rejected.</a:t>
             </a:r>
           </a:p>
           <a:p>
             <a:r>
-              <a:rPr lang="en-US" sz="2000"/>
+              <a:rPr lang="en-US" sz="2000" dirty="0"/>
               <a:t>Fulfilled: The operation completed successfully, and the promise has a resulting value.</a:t>
             </a:r>
           </a:p>
           <a:p>
             <a:r>
-              <a:rPr lang="en-US" sz="2000"/>
+              <a:rPr lang="en-US" sz="2000" dirty="0"/>
               <a:t>Rejected: The operation failed, and the promise has a reason for the failure.</a:t>
             </a:r>
           </a:p>
           <a:p>
             <a:r>
-              <a:rPr lang="en-US" sz="2000"/>
+              <a:rPr lang="en-US" sz="2000" dirty="0"/>
               <a:t>In TypeScript, Promises are typed, allowing developers to specify the type of value the promise will eventually resolve with. This provides additional type safety when working with asynchronous operations.</a:t>
             </a:r>
           </a:p>
@@ -28633,7 +28630,7 @@
           </p:nvPr>
         </p:nvPicPr>
         <p:blipFill>
-          <a:blip r:embed="rId2"/>
+          <a:blip/>
           <a:stretch>
             <a:fillRect/>
           </a:stretch>
@@ -28991,7 +28988,9 @@
         </p:nvSpPr>
         <p:spPr/>
         <p:txBody>
-          <a:bodyPr/>
+          <a:bodyPr>
+            <a:normAutofit fontScale="92500" lnSpcReduction="10000"/>
+          </a:bodyPr>
           <a:lstStyle/>
           <a:p>
             <a:r>
@@ -29088,6 +29087,107 @@
               </a:rPr>
               <a:t> methods, we can handle asynchronous errors and perform operations on the data returned by the API in a readable and organized way.</a:t>
             </a:r>
+          </a:p>
+          <a:p>
+            <a:endParaRPr lang="en-US" dirty="0">
+              <a:solidFill>
+                <a:srgbClr val="374151"/>
+              </a:solidFill>
+              <a:latin typeface="Söhne"/>
+            </a:endParaRPr>
+          </a:p>
+          <a:p>
+            <a:r>
+              <a:rPr lang="en-US" dirty="0">
+                <a:solidFill>
+                  <a:srgbClr val="374151"/>
+                </a:solidFill>
+                <a:latin typeface="Söhne"/>
+              </a:rPr>
+              <a:t>Fetch(‘whatever’).then(res =&gt; { return </a:t>
+            </a:r>
+            <a:r>
+              <a:rPr lang="en-US" dirty="0" err="1">
+                <a:solidFill>
+                  <a:srgbClr val="374151"/>
+                </a:solidFill>
+                <a:latin typeface="Söhne"/>
+              </a:rPr>
+              <a:t>res.json</a:t>
+            </a:r>
+            <a:r>
+              <a:rPr lang="en-US" dirty="0">
+                <a:solidFill>
+                  <a:srgbClr val="374151"/>
+                </a:solidFill>
+                <a:latin typeface="Söhne"/>
+              </a:rPr>
+              <a:t>() }).then(data =&gt; </a:t>
+            </a:r>
+            <a:r>
+              <a:rPr lang="en-US" dirty="0" err="1">
+                <a:solidFill>
+                  <a:srgbClr val="374151"/>
+                </a:solidFill>
+                <a:latin typeface="Söhne"/>
+              </a:rPr>
+              <a:t>console.log</a:t>
+            </a:r>
+            <a:r>
+              <a:rPr lang="en-US" dirty="0">
+                <a:solidFill>
+                  <a:srgbClr val="374151"/>
+                </a:solidFill>
+                <a:latin typeface="Söhne"/>
+              </a:rPr>
+              <a:t>(data))</a:t>
+            </a:r>
+          </a:p>
+          <a:p>
+            <a:pPr marL="0" indent="0">
+              <a:buNone/>
+            </a:pPr>
+            <a:r>
+              <a:rPr lang="en-US" dirty="0" err="1">
+                <a:solidFill>
+                  <a:srgbClr val="374151"/>
+                </a:solidFill>
+                <a:latin typeface="Söhne"/>
+              </a:rPr>
+              <a:t>Res.json</a:t>
+            </a:r>
+            <a:r>
+              <a:rPr lang="en-US" dirty="0">
+                <a:solidFill>
+                  <a:srgbClr val="374151"/>
+                </a:solidFill>
+                <a:latin typeface="Söhne"/>
+              </a:rPr>
+              <a:t> -&gt; take the response and transform it to </a:t>
+            </a:r>
+            <a:r>
+              <a:rPr lang="en-US" dirty="0" err="1">
+                <a:solidFill>
+                  <a:srgbClr val="374151"/>
+                </a:solidFill>
+                <a:latin typeface="Söhne"/>
+              </a:rPr>
+              <a:t>json</a:t>
+            </a:r>
+            <a:r>
+              <a:rPr lang="en-US" dirty="0">
+                <a:solidFill>
+                  <a:srgbClr val="374151"/>
+                </a:solidFill>
+                <a:latin typeface="Söhne"/>
+              </a:rPr>
+              <a:t> (this is also a promise)</a:t>
+            </a:r>
+          </a:p>
+          <a:p>
+            <a:pPr marL="0" indent="0">
+              <a:buNone/>
+            </a:pPr>
             <a:endParaRPr lang="en-IL" dirty="0"/>
           </a:p>
         </p:txBody>
@@ -29268,18 +29368,69 @@
         </p:nvSpPr>
         <p:spPr/>
         <p:txBody>
-          <a:bodyPr/>
+          <a:bodyPr>
+            <a:normAutofit fontScale="55000" lnSpcReduction="20000"/>
+          </a:bodyPr>
           <a:lstStyle/>
           <a:p>
             <a:r>
-              <a:rPr lang="en-IL" dirty="0"/>
-              <a:t>Back end as </a:t>
-            </a:r>
-            <a:r>
-              <a:rPr lang="en-IL"/>
-              <a:t>a service</a:t>
-            </a:r>
-            <a:endParaRPr lang="en-IL" dirty="0"/>
+              <a:rPr lang="en-US" dirty="0"/>
+              <a:t>Backend as a Service, refers to a cloud-based service that provides developers with a pre-built backend infrastructure that they can use to build and operate their mobile and web applications. BaaS providers handle server-side operations such as data storage, user management, push notifications, and social media integration, allowing developers to focus on creating the frontend of their applications.</a:t>
+            </a:r>
+          </a:p>
+          <a:p>
+            <a:r>
+              <a:rPr lang="en-US" dirty="0"/>
+              <a:t>Here are some examples of popular BaaS providers:</a:t>
+            </a:r>
+          </a:p>
+          <a:p>
+            <a:r>
+              <a:rPr lang="en-US" dirty="0"/>
+              <a:t>Firebase: Firebase is a BaaS platform acquired by Google in 2014 that provides a suite of tools and services for mobile and web developers. It includes features like real-time database, authentication, hosting, and cloud messaging.</a:t>
+            </a:r>
+          </a:p>
+          <a:p>
+            <a:r>
+              <a:rPr lang="en-US" dirty="0"/>
+              <a:t>AWS Amplify: AWS Amplify is a BaaS platform offered by Amazon Web Services (AWS) that provides developers with tools and services to build scalable and secure cloud-powered applications. It includes features like authentication, APIs, storage, and hosting.</a:t>
+            </a:r>
+          </a:p>
+          <a:p>
+            <a:r>
+              <a:rPr lang="en-US" dirty="0"/>
+              <a:t>Parse: Parse is an open-source BaaS platform that provides developers with tools and services to build mobile and web applications. It includes features like user authentication, push notifications, and database management.</a:t>
+            </a:r>
+          </a:p>
+          <a:p>
+            <a:r>
+              <a:rPr lang="en-US" dirty="0"/>
+              <a:t>Back4App: Back4App is a BaaS platform that provides developers with a fully managed backend infrastructure. It includes features like user authentication, push notifications, and database management.</a:t>
+            </a:r>
+          </a:p>
+          <a:p>
+            <a:r>
+              <a:rPr lang="en-US" dirty="0" err="1"/>
+              <a:t>Kinvey</a:t>
+            </a:r>
+            <a:r>
+              <a:rPr lang="en-US" dirty="0"/>
+              <a:t>: </a:t>
+            </a:r>
+            <a:r>
+              <a:rPr lang="en-US" dirty="0" err="1"/>
+              <a:t>Kinvey</a:t>
+            </a:r>
+            <a:r>
+              <a:rPr lang="en-US" dirty="0"/>
+              <a:t> is a BaaS platform that provides developers with tools and services to build mobile and web applications. It includes features like data integration, user management, and push notifications.</a:t>
+            </a:r>
+          </a:p>
+          <a:p>
+            <a:r>
+              <a:rPr lang="en-US" dirty="0"/>
+              <a:t>These BaaS platforms are just a few examples of the many options available to developers. By using a BaaS platform, developers can save time and resources by outsourcing the backend infrastructure of their applications and focus on building the frontend features that are unique to their application.</a:t>
+            </a:r>
           </a:p>
         </p:txBody>
       </p:sp>
@@ -29368,12 +29519,9 @@
           <a:p>
             <a:r>
               <a:rPr lang="en-US" dirty="0"/>
-              <a:t>L</a:t>
-            </a:r>
-            <a:r>
-              <a:rPr lang="en-IL" dirty="0"/>
-              <a:t>et’s start talk about getting data!</a:t>
-            </a:r>
+              <a:t>Import export	</a:t>
+            </a:r>
+            <a:endParaRPr lang="en-IL" dirty="0"/>
           </a:p>
         </p:txBody>
       </p:sp>
@@ -29398,6 +29546,22 @@
           <a:bodyPr/>
           <a:lstStyle/>
           <a:p>
+            <a:pPr algn="l"/>
+            <a:r>
+              <a:rPr lang="en-US" b="0" i="0" dirty="0">
+                <a:solidFill>
+                  <a:srgbClr val="374151"/>
+                </a:solidFill>
+                <a:effectLst/>
+                <a:latin typeface="Söhne"/>
+              </a:rPr>
+              <a:t>In TypeScript, importing and exporting modules is done using the import and export keywords, respectively. These keywords are used to define relationships between files and to share functionality between them.</a:t>
+            </a:r>
+          </a:p>
+          <a:p>
+            <a:br>
+              <a:rPr lang="en-US" dirty="0"/>
+            </a:br>
             <a:endParaRPr lang="en-IL" dirty="0"/>
           </a:p>
         </p:txBody>
@@ -29455,12 +29619,19 @@
           <a:p>
             <a:r>
               <a:rPr lang="en-US" dirty="0"/>
-              <a:t>L</a:t>
-            </a:r>
-            <a:r>
-              <a:rPr lang="en-IL" dirty="0"/>
-              <a:t>et’s start talk about getting data!</a:t>
-            </a:r>
+              <a:t>Node </a:t>
+            </a:r>
+            <a:r>
+              <a:rPr lang="en-US" b="0" i="0" dirty="0">
+                <a:solidFill>
+                  <a:srgbClr val="374151"/>
+                </a:solidFill>
+                <a:effectLst/>
+                <a:latin typeface="Söhne"/>
+              </a:rPr>
+              <a:t>modules</a:t>
+            </a:r>
+            <a:endParaRPr lang="en-IL" dirty="0"/>
           </a:p>
         </p:txBody>
       </p:sp>
@@ -29482,8 +29653,122 @@
         </p:nvSpPr>
         <p:spPr/>
         <p:txBody>
-          <a:bodyPr/>
+          <a:bodyPr>
+            <a:normAutofit fontScale="77500" lnSpcReduction="20000"/>
+          </a:bodyPr>
           <a:lstStyle/>
+          <a:p>
+            <a:pPr algn="l"/>
+            <a:r>
+              <a:rPr lang="en-US" b="0" i="0" dirty="0">
+                <a:solidFill>
+                  <a:srgbClr val="374151"/>
+                </a:solidFill>
+                <a:effectLst/>
+                <a:latin typeface="Söhne"/>
+              </a:rPr>
+              <a:t>Node modules are a fundamental feature of Node.js, which is an open-source, cross-platform JavaScript runtime environment. Node modules are simply reusable packages of code that can be easily included in Node.js projects to extend their functionality.</a:t>
+            </a:r>
+          </a:p>
+          <a:p>
+            <a:pPr algn="l"/>
+            <a:r>
+              <a:rPr lang="en-US" b="0" i="0" dirty="0">
+                <a:solidFill>
+                  <a:srgbClr val="374151"/>
+                </a:solidFill>
+                <a:effectLst/>
+                <a:latin typeface="Söhne"/>
+              </a:rPr>
+              <a:t>In Node.js, modules can be created by writing code in separate files, and then exporting specific functions or objects that can be used in other parts of the application. These exported functions or objects are known as the module's "public API".</a:t>
+            </a:r>
+          </a:p>
+          <a:p>
+            <a:pPr algn="l"/>
+            <a:r>
+              <a:rPr lang="en-US" b="0" i="0" dirty="0">
+                <a:solidFill>
+                  <a:srgbClr val="374151"/>
+                </a:solidFill>
+                <a:effectLst/>
+                <a:latin typeface="Söhne"/>
+              </a:rPr>
+              <a:t>There are two types of modules in Node.js: built-in modules and external modules. Built-in modules are modules that are included with the Node.js runtime and can be used without any additional installation. Examples of built-in modules include fs for file system operations, http for creating web servers, and path for working with file paths.</a:t>
+            </a:r>
+          </a:p>
+          <a:p>
+            <a:pPr algn="l"/>
+            <a:r>
+              <a:rPr lang="en-US" b="0" i="0" dirty="0">
+                <a:solidFill>
+                  <a:srgbClr val="374151"/>
+                </a:solidFill>
+                <a:effectLst/>
+                <a:latin typeface="Söhne"/>
+              </a:rPr>
+              <a:t>External modules, on the other hand, are modules that are created by third-party developers and can be downloaded and installed using Node.js's built-in package manager, </a:t>
+            </a:r>
+            <a:r>
+              <a:rPr lang="en-US" b="0" i="0" dirty="0" err="1">
+                <a:solidFill>
+                  <a:srgbClr val="374151"/>
+                </a:solidFill>
+                <a:effectLst/>
+                <a:latin typeface="Söhne"/>
+              </a:rPr>
+              <a:t>npm</a:t>
+            </a:r>
+            <a:r>
+              <a:rPr lang="en-US" b="0" i="0" dirty="0">
+                <a:solidFill>
+                  <a:srgbClr val="374151"/>
+                </a:solidFill>
+                <a:effectLst/>
+                <a:latin typeface="Söhne"/>
+              </a:rPr>
+              <a:t>. </a:t>
+            </a:r>
+            <a:r>
+              <a:rPr lang="en-US" b="0" i="0" dirty="0" err="1">
+                <a:solidFill>
+                  <a:srgbClr val="374151"/>
+                </a:solidFill>
+                <a:effectLst/>
+                <a:latin typeface="Söhne"/>
+              </a:rPr>
+              <a:t>npm</a:t>
+            </a:r>
+            <a:r>
+              <a:rPr lang="en-US" b="0" i="0" dirty="0">
+                <a:solidFill>
+                  <a:srgbClr val="374151"/>
+                </a:solidFill>
+                <a:effectLst/>
+                <a:latin typeface="Söhne"/>
+              </a:rPr>
+              <a:t> provides access to a vast ecosystem of external modules, which can be easily installed and managed using the </a:t>
+            </a:r>
+            <a:r>
+              <a:rPr lang="en-US" b="0" i="0" dirty="0" err="1">
+                <a:solidFill>
+                  <a:srgbClr val="374151"/>
+                </a:solidFill>
+                <a:effectLst/>
+                <a:latin typeface="Söhne"/>
+              </a:rPr>
+              <a:t>npm</a:t>
+            </a:r>
+            <a:r>
+              <a:rPr lang="en-US" b="0" i="0" dirty="0">
+                <a:solidFill>
+                  <a:srgbClr val="374151"/>
+                </a:solidFill>
+                <a:effectLst/>
+                <a:latin typeface="Söhne"/>
+              </a:rPr>
+              <a:t> install command.</a:t>
+            </a:r>
+          </a:p>
           <a:p>
             <a:endParaRPr lang="en-IL" dirty="0"/>
           </a:p>
@@ -29541,13 +29826,18 @@
           <a:lstStyle/>
           <a:p>
             <a:r>
+              <a:rPr lang="en-US" dirty="0" err="1"/>
+              <a:t>Vite</a:t>
+            </a:r>
+            <a:r>
               <a:rPr lang="en-US" dirty="0"/>
-              <a:t>L</a:t>
-            </a:r>
-            <a:r>
-              <a:rPr lang="en-IL" dirty="0"/>
-              <a:t>et’s start talk about getting data!</a:t>
-            </a:r>
+              <a:t> </a:t>
+            </a:r>
+            <a:r>
+              <a:rPr lang="en-US" dirty="0" err="1"/>
+              <a:t>url</a:t>
+            </a:r>
+            <a:endParaRPr lang="en-IL" dirty="0"/>
           </a:p>
         </p:txBody>
       </p:sp>
@@ -29572,6 +29862,18 @@
           <a:bodyPr/>
           <a:lstStyle/>
           <a:p>
+            <a:r>
+              <a:rPr lang="en-US" dirty="0"/>
+              <a:t>https://</a:t>
+            </a:r>
+            <a:r>
+              <a:rPr lang="en-US" dirty="0" err="1"/>
+              <a:t>vitejs.dev</a:t>
+            </a:r>
+            <a:r>
+              <a:rPr lang="en-US" dirty="0"/>
+              <a:t>/guide/</a:t>
+            </a:r>
             <a:endParaRPr lang="en-IL" dirty="0"/>
           </a:p>
         </p:txBody>
@@ -29628,13 +29930,10 @@
           <a:lstStyle/>
           <a:p>
             <a:r>
-              <a:rPr lang="en-US" dirty="0"/>
-              <a:t>L</a:t>
-            </a:r>
-            <a:r>
-              <a:rPr lang="en-IL" dirty="0"/>
-              <a:t>et’s start talk about getting data!</a:t>
-            </a:r>
+              <a:rPr lang="en-US" dirty="0" err="1"/>
+              <a:t>vite</a:t>
+            </a:r>
+            <a:endParaRPr lang="en-IL" dirty="0"/>
           </a:p>
         </p:txBody>
       </p:sp>
@@ -29656,8 +29955,82 @@
         </p:nvSpPr>
         <p:spPr/>
         <p:txBody>
-          <a:bodyPr/>
+          <a:bodyPr>
+            <a:normAutofit fontScale="70000" lnSpcReduction="20000"/>
+          </a:bodyPr>
           <a:lstStyle/>
+          <a:p>
+            <a:r>
+              <a:rPr lang="en-US" dirty="0" err="1"/>
+              <a:t>Vite</a:t>
+            </a:r>
+            <a:r>
+              <a:rPr lang="en-US" dirty="0"/>
+              <a:t> is a modern, fast, and lightweight build tool and development server for web applications. It was developed by Evan You, the creator of </a:t>
+            </a:r>
+            <a:r>
+              <a:rPr lang="en-US" dirty="0" err="1"/>
+              <a:t>Vue.js</a:t>
+            </a:r>
+            <a:r>
+              <a:rPr lang="en-US" dirty="0"/>
+              <a:t>, and is designed to provide a smooth and efficient development experience for modern web development workflows.</a:t>
+            </a:r>
+          </a:p>
+          <a:p>
+            <a:r>
+              <a:rPr lang="en-US" dirty="0"/>
+              <a:t>One of the key features of </a:t>
+            </a:r>
+            <a:r>
+              <a:rPr lang="en-US" dirty="0" err="1"/>
+              <a:t>Vite</a:t>
+            </a:r>
+            <a:r>
+              <a:rPr lang="en-US" dirty="0"/>
+              <a:t> is its fast build times, which are achieved by leveraging the native ES modules support in modern web browsers. Instead of bundling all your code into a single JavaScript file, </a:t>
+            </a:r>
+            <a:r>
+              <a:rPr lang="en-US" dirty="0" err="1"/>
+              <a:t>Vite</a:t>
+            </a:r>
+            <a:r>
+              <a:rPr lang="en-US" dirty="0"/>
+              <a:t> uses a "just-in-time" (JIT) compilation strategy that allows it to compile and serve individual modules on demand, as they are requested by the browser.</a:t>
+            </a:r>
+          </a:p>
+          <a:p>
+            <a:r>
+              <a:rPr lang="en-US" dirty="0"/>
+              <a:t>In addition to fast build times, </a:t>
+            </a:r>
+            <a:r>
+              <a:rPr lang="en-US" dirty="0" err="1"/>
+              <a:t>Vite</a:t>
+            </a:r>
+            <a:r>
+              <a:rPr lang="en-US" dirty="0"/>
+              <a:t> also includes a built-in development server that supports features like hot module replacement (HMR) and fast-refreshing. This means that you can make changes to your code and see the results in your browser almost instantly, without having to manually refresh the page.</a:t>
+            </a:r>
+          </a:p>
+          <a:p>
+            <a:r>
+              <a:rPr lang="en-US" dirty="0" err="1"/>
+              <a:t>Vite</a:t>
+            </a:r>
+            <a:r>
+              <a:rPr lang="en-US" dirty="0"/>
+              <a:t> also supports a wide range of modern web development technologies, including TypeScript, React, </a:t>
+            </a:r>
+            <a:r>
+              <a:rPr lang="en-US" dirty="0" err="1"/>
+              <a:t>Vue.js</a:t>
+            </a:r>
+            <a:r>
+              <a:rPr lang="en-US" dirty="0"/>
+              <a:t>, and CSS preprocessors like Sass and Less. It provides a simple and intuitive configuration file format that makes it easy to customize and extend the build process to suit your specific needs.</a:t>
+            </a:r>
+          </a:p>
           <a:p>
             <a:endParaRPr lang="en-IL" dirty="0"/>
           </a:p>
@@ -29715,13 +30088,14 @@
           <a:lstStyle/>
           <a:p>
             <a:r>
+              <a:rPr lang="en-US" dirty="0" err="1"/>
+              <a:t>Next.js</a:t>
+            </a:r>
+            <a:r>
               <a:rPr lang="en-US" dirty="0"/>
-              <a:t>L</a:t>
-            </a:r>
-            <a:r>
-              <a:rPr lang="en-IL" dirty="0"/>
-              <a:t>et’s start talk about getting data!</a:t>
-            </a:r>
+              <a:t> start!</a:t>
+            </a:r>
+            <a:endParaRPr lang="en-IL" dirty="0"/>
           </a:p>
         </p:txBody>
       </p:sp>
@@ -29743,10 +30117,401 @@
         </p:nvSpPr>
         <p:spPr/>
         <p:txBody>
-          <a:bodyPr/>
+          <a:bodyPr>
+            <a:normAutofit fontScale="92500" lnSpcReduction="20000"/>
+          </a:bodyPr>
           <a:lstStyle/>
           <a:p>
-            <a:endParaRPr lang="en-IL" dirty="0"/>
+            <a:pPr algn="l"/>
+            <a:r>
+              <a:rPr lang="en-US" sz="1600" b="0" i="0" dirty="0" err="1">
+                <a:solidFill>
+                  <a:srgbClr val="374151"/>
+                </a:solidFill>
+                <a:effectLst/>
+                <a:latin typeface="Söhne"/>
+              </a:rPr>
+              <a:t>Next.js</a:t>
+            </a:r>
+            <a:r>
+              <a:rPr lang="en-US" sz="1600" b="0" i="0" dirty="0">
+                <a:solidFill>
+                  <a:srgbClr val="374151"/>
+                </a:solidFill>
+                <a:effectLst/>
+                <a:latin typeface="Söhne"/>
+              </a:rPr>
+              <a:t> is a popular, open-source React framework developed by </a:t>
+            </a:r>
+            <a:r>
+              <a:rPr lang="en-US" sz="1600" b="0" i="0" dirty="0" err="1">
+                <a:solidFill>
+                  <a:srgbClr val="374151"/>
+                </a:solidFill>
+                <a:effectLst/>
+                <a:latin typeface="Söhne"/>
+              </a:rPr>
+              <a:t>Vercel</a:t>
+            </a:r>
+            <a:r>
+              <a:rPr lang="en-US" sz="1600" b="0" i="0" dirty="0">
+                <a:solidFill>
+                  <a:srgbClr val="374151"/>
+                </a:solidFill>
+                <a:effectLst/>
+                <a:latin typeface="Söhne"/>
+              </a:rPr>
+              <a:t>. It simplifies the process of building modern web applications, particularly server-rendered React applications. With a focus on performance, developer experience, and scalability, </a:t>
+            </a:r>
+            <a:r>
+              <a:rPr lang="en-US" sz="1600" b="0" i="0" dirty="0" err="1">
+                <a:solidFill>
+                  <a:srgbClr val="374151"/>
+                </a:solidFill>
+                <a:effectLst/>
+                <a:latin typeface="Söhne"/>
+              </a:rPr>
+              <a:t>Next.js</a:t>
+            </a:r>
+            <a:r>
+              <a:rPr lang="en-US" sz="1600" b="0" i="0" dirty="0">
+                <a:solidFill>
+                  <a:srgbClr val="374151"/>
+                </a:solidFill>
+                <a:effectLst/>
+                <a:latin typeface="Söhne"/>
+              </a:rPr>
+              <a:t> offers features such as server-side rendering (SSR), static site generation (SSG), and API routes.</a:t>
+            </a:r>
+          </a:p>
+          <a:p>
+            <a:pPr algn="l"/>
+            <a:r>
+              <a:rPr lang="en-US" sz="1600" b="0" i="0" dirty="0">
+                <a:solidFill>
+                  <a:srgbClr val="374151"/>
+                </a:solidFill>
+                <a:effectLst/>
+                <a:latin typeface="Söhne"/>
+              </a:rPr>
+              <a:t>Here are some key concepts and features of </a:t>
+            </a:r>
+            <a:r>
+              <a:rPr lang="en-US" sz="1600" b="0" i="0" dirty="0" err="1">
+                <a:solidFill>
+                  <a:srgbClr val="374151"/>
+                </a:solidFill>
+                <a:effectLst/>
+                <a:latin typeface="Söhne"/>
+              </a:rPr>
+              <a:t>Next.js</a:t>
+            </a:r>
+            <a:r>
+              <a:rPr lang="en-US" sz="1600" b="0" i="0" dirty="0">
+                <a:solidFill>
+                  <a:srgbClr val="374151"/>
+                </a:solidFill>
+                <a:effectLst/>
+                <a:latin typeface="Söhne"/>
+              </a:rPr>
+              <a:t>:</a:t>
+            </a:r>
+          </a:p>
+          <a:p>
+            <a:pPr algn="l">
+              <a:buFont typeface="+mj-lt"/>
+              <a:buAutoNum type="arabicPeriod"/>
+            </a:pPr>
+            <a:r>
+              <a:rPr lang="en-US" sz="1600" b="0" i="0" dirty="0">
+                <a:solidFill>
+                  <a:srgbClr val="374151"/>
+                </a:solidFill>
+                <a:effectLst/>
+                <a:latin typeface="Söhne"/>
+              </a:rPr>
+              <a:t>File-based routing: </a:t>
+            </a:r>
+            <a:r>
+              <a:rPr lang="en-US" sz="1600" b="0" i="0" dirty="0" err="1">
+                <a:solidFill>
+                  <a:srgbClr val="374151"/>
+                </a:solidFill>
+                <a:effectLst/>
+                <a:latin typeface="Söhne"/>
+              </a:rPr>
+              <a:t>Next.js</a:t>
+            </a:r>
+            <a:r>
+              <a:rPr lang="en-US" sz="1600" b="0" i="0" dirty="0">
+                <a:solidFill>
+                  <a:srgbClr val="374151"/>
+                </a:solidFill>
+                <a:effectLst/>
+                <a:latin typeface="Söhne"/>
+              </a:rPr>
+              <a:t> automatically generates routes based on the file structure inside the pages directory. For example, if you create a file named </a:t>
+            </a:r>
+            <a:r>
+              <a:rPr lang="en-US" sz="1600" b="0" i="0" dirty="0" err="1">
+                <a:solidFill>
+                  <a:srgbClr val="374151"/>
+                </a:solidFill>
+                <a:effectLst/>
+                <a:latin typeface="Söhne"/>
+              </a:rPr>
+              <a:t>about.js</a:t>
+            </a:r>
+            <a:r>
+              <a:rPr lang="en-US" sz="1600" b="0" i="0" dirty="0">
+                <a:solidFill>
+                  <a:srgbClr val="374151"/>
+                </a:solidFill>
+                <a:effectLst/>
+                <a:latin typeface="Söhne"/>
+              </a:rPr>
+              <a:t> in the pages folder, it will be accessible at the /about route.</a:t>
+            </a:r>
+          </a:p>
+          <a:p>
+            <a:pPr algn="l">
+              <a:buFont typeface="+mj-lt"/>
+              <a:buAutoNum type="arabicPeriod"/>
+            </a:pPr>
+            <a:r>
+              <a:rPr lang="en-US" sz="1600" b="0" i="0" dirty="0">
+                <a:solidFill>
+                  <a:srgbClr val="374151"/>
+                </a:solidFill>
+                <a:effectLst/>
+                <a:latin typeface="Söhne"/>
+              </a:rPr>
+              <a:t>Server-side rendering (SSR): </a:t>
+            </a:r>
+            <a:r>
+              <a:rPr lang="en-US" sz="1600" b="0" i="0" dirty="0" err="1">
+                <a:solidFill>
+                  <a:srgbClr val="374151"/>
+                </a:solidFill>
+                <a:effectLst/>
+                <a:latin typeface="Söhne"/>
+              </a:rPr>
+              <a:t>Next.js</a:t>
+            </a:r>
+            <a:r>
+              <a:rPr lang="en-US" sz="1600" b="0" i="0" dirty="0">
+                <a:solidFill>
+                  <a:srgbClr val="374151"/>
+                </a:solidFill>
+                <a:effectLst/>
+                <a:latin typeface="Söhne"/>
+              </a:rPr>
+              <a:t> supports SSR out-of-the-box. This allows you to fetch data on the server before rendering the page, improving the performance and SEO of your application. To enable SSR, you can use the </a:t>
+            </a:r>
+            <a:r>
+              <a:rPr lang="en-US" sz="1600" b="0" i="0" dirty="0" err="1">
+                <a:solidFill>
+                  <a:srgbClr val="374151"/>
+                </a:solidFill>
+                <a:effectLst/>
+                <a:latin typeface="Söhne"/>
+              </a:rPr>
+              <a:t>getServerSideProps</a:t>
+            </a:r>
+            <a:r>
+              <a:rPr lang="en-US" sz="1600" b="0" i="0" dirty="0">
+                <a:solidFill>
+                  <a:srgbClr val="374151"/>
+                </a:solidFill>
+                <a:effectLst/>
+                <a:latin typeface="Söhne"/>
+              </a:rPr>
+              <a:t> function in your page component.</a:t>
+            </a:r>
+          </a:p>
+          <a:p>
+            <a:pPr algn="l">
+              <a:buFont typeface="+mj-lt"/>
+              <a:buAutoNum type="arabicPeriod"/>
+            </a:pPr>
+            <a:r>
+              <a:rPr lang="en-US" sz="1600" b="0" i="0" dirty="0">
+                <a:solidFill>
+                  <a:srgbClr val="374151"/>
+                </a:solidFill>
+                <a:effectLst/>
+                <a:latin typeface="Söhne"/>
+              </a:rPr>
+              <a:t>Static site generation (SSG): </a:t>
+            </a:r>
+            <a:r>
+              <a:rPr lang="en-US" sz="1600" b="0" i="0" dirty="0" err="1">
+                <a:solidFill>
+                  <a:srgbClr val="374151"/>
+                </a:solidFill>
+                <a:effectLst/>
+                <a:latin typeface="Söhne"/>
+              </a:rPr>
+              <a:t>Next.js</a:t>
+            </a:r>
+            <a:r>
+              <a:rPr lang="en-US" sz="1600" b="0" i="0" dirty="0">
+                <a:solidFill>
+                  <a:srgbClr val="374151"/>
+                </a:solidFill>
+                <a:effectLst/>
+                <a:latin typeface="Söhne"/>
+              </a:rPr>
+              <a:t> also supports SSG, which enables you to pre-render pages at build time. This is useful for content that doesn't change frequently, as it reduces server load and improves performance. To enable SSG, you can use the </a:t>
+            </a:r>
+            <a:r>
+              <a:rPr lang="en-US" sz="1600" b="0" i="0" dirty="0" err="1">
+                <a:solidFill>
+                  <a:srgbClr val="374151"/>
+                </a:solidFill>
+                <a:effectLst/>
+                <a:latin typeface="Söhne"/>
+              </a:rPr>
+              <a:t>getStaticProps</a:t>
+            </a:r>
+            <a:r>
+              <a:rPr lang="en-US" sz="1600" b="0" i="0" dirty="0">
+                <a:solidFill>
+                  <a:srgbClr val="374151"/>
+                </a:solidFill>
+                <a:effectLst/>
+                <a:latin typeface="Söhne"/>
+              </a:rPr>
+              <a:t> function in your page component.</a:t>
+            </a:r>
+          </a:p>
+          <a:p>
+            <a:pPr algn="l">
+              <a:buFont typeface="+mj-lt"/>
+              <a:buAutoNum type="arabicPeriod"/>
+            </a:pPr>
+            <a:r>
+              <a:rPr lang="en-US" sz="1600" b="0" i="0" dirty="0">
+                <a:solidFill>
+                  <a:srgbClr val="374151"/>
+                </a:solidFill>
+                <a:effectLst/>
+                <a:latin typeface="Söhne"/>
+              </a:rPr>
+              <a:t>API routes: </a:t>
+            </a:r>
+            <a:r>
+              <a:rPr lang="en-US" sz="1600" b="0" i="0" dirty="0" err="1">
+                <a:solidFill>
+                  <a:srgbClr val="374151"/>
+                </a:solidFill>
+                <a:effectLst/>
+                <a:latin typeface="Söhne"/>
+              </a:rPr>
+              <a:t>Next.js</a:t>
+            </a:r>
+            <a:r>
+              <a:rPr lang="en-US" sz="1600" b="0" i="0" dirty="0">
+                <a:solidFill>
+                  <a:srgbClr val="374151"/>
+                </a:solidFill>
+                <a:effectLst/>
+                <a:latin typeface="Söhne"/>
+              </a:rPr>
+              <a:t> allows you to create serverless API routes by placing files inside the pages/</a:t>
+            </a:r>
+            <a:r>
+              <a:rPr lang="en-US" sz="1600" b="0" i="0" dirty="0" err="1">
+                <a:solidFill>
+                  <a:srgbClr val="374151"/>
+                </a:solidFill>
+                <a:effectLst/>
+                <a:latin typeface="Söhne"/>
+              </a:rPr>
+              <a:t>api</a:t>
+            </a:r>
+            <a:r>
+              <a:rPr lang="en-US" sz="1600" b="0" i="0" dirty="0">
+                <a:solidFill>
+                  <a:srgbClr val="374151"/>
+                </a:solidFill>
+                <a:effectLst/>
+                <a:latin typeface="Söhne"/>
+              </a:rPr>
+              <a:t> directory. These routes are automatically available as serverless functions that can handle HTTP requests. You can use these API routes to build your application's backend logic.</a:t>
+            </a:r>
+          </a:p>
+          <a:p>
+            <a:pPr algn="l">
+              <a:buFont typeface="+mj-lt"/>
+              <a:buAutoNum type="arabicPeriod"/>
+            </a:pPr>
+            <a:r>
+              <a:rPr lang="en-US" sz="1600" b="0" i="0" dirty="0">
+                <a:solidFill>
+                  <a:srgbClr val="374151"/>
+                </a:solidFill>
+                <a:effectLst/>
+                <a:latin typeface="Söhne"/>
+              </a:rPr>
+              <a:t>Dynamic imports: </a:t>
+            </a:r>
+            <a:r>
+              <a:rPr lang="en-US" sz="1600" b="0" i="0" dirty="0" err="1">
+                <a:solidFill>
+                  <a:srgbClr val="374151"/>
+                </a:solidFill>
+                <a:effectLst/>
+                <a:latin typeface="Söhne"/>
+              </a:rPr>
+              <a:t>Next.js</a:t>
+            </a:r>
+            <a:r>
+              <a:rPr lang="en-US" sz="1600" b="0" i="0" dirty="0">
+                <a:solidFill>
+                  <a:srgbClr val="374151"/>
+                </a:solidFill>
+                <a:effectLst/>
+                <a:latin typeface="Söhne"/>
+              </a:rPr>
+              <a:t> supports dynamic imports, which means you can load parts of your application only when they are needed. This can help improve the performance of your application by reducing the initial bundle size.</a:t>
+            </a:r>
+          </a:p>
+          <a:p>
+            <a:pPr algn="l">
+              <a:buFont typeface="+mj-lt"/>
+              <a:buAutoNum type="arabicPeriod"/>
+            </a:pPr>
+            <a:r>
+              <a:rPr lang="en-US" sz="1600" b="0" i="0" dirty="0">
+                <a:solidFill>
+                  <a:srgbClr val="374151"/>
+                </a:solidFill>
+                <a:effectLst/>
+                <a:latin typeface="Söhne"/>
+              </a:rPr>
+              <a:t>Built-in CSS and Sass support: </a:t>
+            </a:r>
+            <a:r>
+              <a:rPr lang="en-US" sz="1600" b="0" i="0" dirty="0" err="1">
+                <a:solidFill>
+                  <a:srgbClr val="374151"/>
+                </a:solidFill>
+                <a:effectLst/>
+                <a:latin typeface="Söhne"/>
+              </a:rPr>
+              <a:t>Next.js</a:t>
+            </a:r>
+            <a:r>
+              <a:rPr lang="en-US" sz="1600" b="0" i="0" dirty="0">
+                <a:solidFill>
+                  <a:srgbClr val="374151"/>
+                </a:solidFill>
+                <a:effectLst/>
+                <a:latin typeface="Söhne"/>
+              </a:rPr>
+              <a:t> comes with built-in support for CSS and Sass styling, which makes it easy to style your components without needing additional configuration.</a:t>
+            </a:r>
           </a:p>
         </p:txBody>
       </p:sp>
@@ -29803,12 +30568,9 @@
           <a:p>
             <a:r>
               <a:rPr lang="en-US" dirty="0"/>
-              <a:t>L</a:t>
-            </a:r>
-            <a:r>
-              <a:rPr lang="en-IL" dirty="0"/>
-              <a:t>et’s start talk about getting data!</a:t>
-            </a:r>
+              <a:t>Let’s start</a:t>
+            </a:r>
+            <a:endParaRPr lang="en-IL" dirty="0"/>
           </a:p>
         </p:txBody>
       </p:sp>
@@ -29833,6 +30595,18 @@
           <a:bodyPr/>
           <a:lstStyle/>
           <a:p>
+            <a:r>
+              <a:rPr lang="en-US" dirty="0"/>
+              <a:t>https://</a:t>
+            </a:r>
+            <a:r>
+              <a:rPr lang="en-US" dirty="0" err="1"/>
+              <a:t>nextjs.org</a:t>
+            </a:r>
+            <a:r>
+              <a:rPr lang="en-US" dirty="0"/>
+              <a:t>/docs</a:t>
+            </a:r>
             <a:endParaRPr lang="en-IL" dirty="0"/>
           </a:p>
         </p:txBody>
@@ -29889,13 +30663,10 @@
           <a:lstStyle/>
           <a:p>
             <a:r>
-              <a:rPr lang="en-US" dirty="0"/>
-              <a:t>L</a:t>
-            </a:r>
-            <a:r>
-              <a:rPr lang="en-IL" dirty="0"/>
-              <a:t>et’s start talk about getting data!</a:t>
-            </a:r>
+              <a:rPr lang="en-US"/>
+              <a:t>React start</a:t>
+            </a:r>
+            <a:endParaRPr lang="en-IL" dirty="0"/>
           </a:p>
         </p:txBody>
       </p:sp>
@@ -30242,7 +31013,7 @@
           <p:nvPr/>
         </p:nvPicPr>
         <p:blipFill rotWithShape="1">
-          <a:blip r:embed="rId2"/>
+          <a:blip/>
           <a:srcRect l="3000" r="51576" b="-1"/>
           <a:stretch/>
         </p:blipFill>

</xml_diff>